<commit_message>
update document and small code improvements
</commit_message>
<xml_diff>
--- a/figures/figures.pptx
+++ b/figures/figures.pptx
@@ -261,7 +261,7 @@
           <a:p>
             <a:fld id="{A11FC31E-576A-45E5-BB70-BB7016BFFCA0}" type="datetimeFigureOut">
               <a:rPr lang="nl-NL" smtClean="0"/>
-              <a:t>28-5-2024</a:t>
+              <a:t>23-6-2024</a:t>
             </a:fld>
             <a:endParaRPr lang="nl-NL" dirty="0"/>
           </a:p>
@@ -461,7 +461,7 @@
           <a:p>
             <a:fld id="{A11FC31E-576A-45E5-BB70-BB7016BFFCA0}" type="datetimeFigureOut">
               <a:rPr lang="nl-NL" smtClean="0"/>
-              <a:t>28-5-2024</a:t>
+              <a:t>23-6-2024</a:t>
             </a:fld>
             <a:endParaRPr lang="nl-NL" dirty="0"/>
           </a:p>
@@ -671,7 +671,7 @@
           <a:p>
             <a:fld id="{A11FC31E-576A-45E5-BB70-BB7016BFFCA0}" type="datetimeFigureOut">
               <a:rPr lang="nl-NL" smtClean="0"/>
-              <a:t>28-5-2024</a:t>
+              <a:t>23-6-2024</a:t>
             </a:fld>
             <a:endParaRPr lang="nl-NL" dirty="0"/>
           </a:p>
@@ -871,7 +871,7 @@
           <a:p>
             <a:fld id="{A11FC31E-576A-45E5-BB70-BB7016BFFCA0}" type="datetimeFigureOut">
               <a:rPr lang="nl-NL" smtClean="0"/>
-              <a:t>28-5-2024</a:t>
+              <a:t>23-6-2024</a:t>
             </a:fld>
             <a:endParaRPr lang="nl-NL" dirty="0"/>
           </a:p>
@@ -1147,7 +1147,7 @@
           <a:p>
             <a:fld id="{A11FC31E-576A-45E5-BB70-BB7016BFFCA0}" type="datetimeFigureOut">
               <a:rPr lang="nl-NL" smtClean="0"/>
-              <a:t>28-5-2024</a:t>
+              <a:t>23-6-2024</a:t>
             </a:fld>
             <a:endParaRPr lang="nl-NL" dirty="0"/>
           </a:p>
@@ -1415,7 +1415,7 @@
           <a:p>
             <a:fld id="{A11FC31E-576A-45E5-BB70-BB7016BFFCA0}" type="datetimeFigureOut">
               <a:rPr lang="nl-NL" smtClean="0"/>
-              <a:t>28-5-2024</a:t>
+              <a:t>23-6-2024</a:t>
             </a:fld>
             <a:endParaRPr lang="nl-NL" dirty="0"/>
           </a:p>
@@ -1830,7 +1830,7 @@
           <a:p>
             <a:fld id="{A11FC31E-576A-45E5-BB70-BB7016BFFCA0}" type="datetimeFigureOut">
               <a:rPr lang="nl-NL" smtClean="0"/>
-              <a:t>28-5-2024</a:t>
+              <a:t>23-6-2024</a:t>
             </a:fld>
             <a:endParaRPr lang="nl-NL" dirty="0"/>
           </a:p>
@@ -1972,7 +1972,7 @@
           <a:p>
             <a:fld id="{A11FC31E-576A-45E5-BB70-BB7016BFFCA0}" type="datetimeFigureOut">
               <a:rPr lang="nl-NL" smtClean="0"/>
-              <a:t>28-5-2024</a:t>
+              <a:t>23-6-2024</a:t>
             </a:fld>
             <a:endParaRPr lang="nl-NL" dirty="0"/>
           </a:p>
@@ -2085,7 +2085,7 @@
           <a:p>
             <a:fld id="{A11FC31E-576A-45E5-BB70-BB7016BFFCA0}" type="datetimeFigureOut">
               <a:rPr lang="nl-NL" smtClean="0"/>
-              <a:t>28-5-2024</a:t>
+              <a:t>23-6-2024</a:t>
             </a:fld>
             <a:endParaRPr lang="nl-NL" dirty="0"/>
           </a:p>
@@ -2398,7 +2398,7 @@
           <a:p>
             <a:fld id="{A11FC31E-576A-45E5-BB70-BB7016BFFCA0}" type="datetimeFigureOut">
               <a:rPr lang="nl-NL" smtClean="0"/>
-              <a:t>28-5-2024</a:t>
+              <a:t>23-6-2024</a:t>
             </a:fld>
             <a:endParaRPr lang="nl-NL" dirty="0"/>
           </a:p>
@@ -2687,7 +2687,7 @@
           <a:p>
             <a:fld id="{A11FC31E-576A-45E5-BB70-BB7016BFFCA0}" type="datetimeFigureOut">
               <a:rPr lang="nl-NL" smtClean="0"/>
-              <a:t>28-5-2024</a:t>
+              <a:t>23-6-2024</a:t>
             </a:fld>
             <a:endParaRPr lang="nl-NL" dirty="0"/>
           </a:p>
@@ -2930,7 +2930,7 @@
           <a:p>
             <a:fld id="{A11FC31E-576A-45E5-BB70-BB7016BFFCA0}" type="datetimeFigureOut">
               <a:rPr lang="nl-NL" smtClean="0"/>
-              <a:t>28-5-2024</a:t>
+              <a:t>23-6-2024</a:t>
             </a:fld>
             <a:endParaRPr lang="nl-NL" dirty="0"/>
           </a:p>
@@ -3347,740 +3347,1085 @@
           <a:chExt cx="0" cy="0"/>
         </a:xfrm>
       </p:grpSpPr>
-      <p:sp>
-        <p:nvSpPr>
-          <p:cNvPr id="11" name="TextBox 10">
-            <a:extLst>
-              <a:ext uri="{FF2B5EF4-FFF2-40B4-BE49-F238E27FC236}">
-                <a16:creationId xmlns:a16="http://schemas.microsoft.com/office/drawing/2014/main" id="{6180F637-47BD-BA6B-0DF9-796BAC1FC62E}"/>
-              </a:ext>
-            </a:extLst>
-          </p:cNvPr>
-          <p:cNvSpPr txBox="1"/>
+      <p:grpSp>
+        <p:nvGrpSpPr>
+          <p:cNvPr id="2" name="Group 1">
+            <a:extLst>
+              <a:ext uri="{FF2B5EF4-FFF2-40B4-BE49-F238E27FC236}">
+                <a16:creationId xmlns:a16="http://schemas.microsoft.com/office/drawing/2014/main" id="{D4CA0003-6A24-3E3F-39EE-C7E75AE16534}"/>
+              </a:ext>
+            </a:extLst>
+          </p:cNvPr>
+          <p:cNvGrpSpPr/>
           <p:nvPr/>
-        </p:nvSpPr>
-        <p:spPr>
+        </p:nvGrpSpPr>
+        <p:grpSpPr>
           <a:xfrm>
-            <a:off x="2637354" y="2119744"/>
-            <a:ext cx="1749115" cy="338554"/>
+            <a:off x="263324" y="326289"/>
+            <a:ext cx="11093796" cy="3898772"/>
+            <a:chOff x="263324" y="326289"/>
+            <a:chExt cx="11093796" cy="3898772"/>
           </a:xfrm>
-          <a:prstGeom prst="rect">
-            <a:avLst/>
-          </a:prstGeom>
-          <a:noFill/>
-        </p:spPr>
-        <p:txBody>
-          <a:bodyPr wrap="square" rtlCol="0">
-            <a:spAutoFit/>
-          </a:bodyPr>
-          <a:lstStyle/>
-          <a:p>
-            <a:r>
-              <a:rPr lang="nl-NL" sz="1600" dirty="0">
-                <a:latin typeface="Times New Roman" panose="02020603050405020304" pitchFamily="18" charset="0"/>
-                <a:cs typeface="Times New Roman" panose="02020603050405020304" pitchFamily="18" charset="0"/>
-              </a:rPr>
-              <a:t>Sequence masking</a:t>
-            </a:r>
-          </a:p>
-        </p:txBody>
-      </p:sp>
-      <p:sp>
-        <p:nvSpPr>
-          <p:cNvPr id="12" name="TextBox 11">
-            <a:extLst>
-              <a:ext uri="{FF2B5EF4-FFF2-40B4-BE49-F238E27FC236}">
-                <a16:creationId xmlns:a16="http://schemas.microsoft.com/office/drawing/2014/main" id="{D84EB264-A8D8-C11F-A6E8-E72431364513}"/>
-              </a:ext>
-            </a:extLst>
-          </p:cNvPr>
-          <p:cNvSpPr txBox="1"/>
+        </p:grpSpPr>
+        <p:sp>
+          <p:nvSpPr>
+            <p:cNvPr id="11" name="TextBox 10">
+              <a:extLst>
+                <a:ext uri="{FF2B5EF4-FFF2-40B4-BE49-F238E27FC236}">
+                  <a16:creationId xmlns:a16="http://schemas.microsoft.com/office/drawing/2014/main" id="{6180F637-47BD-BA6B-0DF9-796BAC1FC62E}"/>
+                </a:ext>
+              </a:extLst>
+            </p:cNvPr>
+            <p:cNvSpPr txBox="1"/>
+            <p:nvPr/>
+          </p:nvSpPr>
+          <p:spPr>
+            <a:xfrm>
+              <a:off x="2637354" y="2119744"/>
+              <a:ext cx="1749115" cy="338554"/>
+            </a:xfrm>
+            <a:prstGeom prst="rect">
+              <a:avLst/>
+            </a:prstGeom>
+            <a:noFill/>
+          </p:spPr>
+          <p:txBody>
+            <a:bodyPr wrap="square" rtlCol="0">
+              <a:spAutoFit/>
+            </a:bodyPr>
+            <a:lstStyle/>
+            <a:p>
+              <a:r>
+                <a:rPr lang="nl-NL" sz="1600" dirty="0">
+                  <a:latin typeface="Times New Roman" panose="02020603050405020304" pitchFamily="18" charset="0"/>
+                  <a:cs typeface="Times New Roman" panose="02020603050405020304" pitchFamily="18" charset="0"/>
+                </a:rPr>
+                <a:t>Sequence masking</a:t>
+              </a:r>
+            </a:p>
+          </p:txBody>
+        </p:sp>
+        <p:sp>
+          <p:nvSpPr>
+            <p:cNvPr id="12" name="TextBox 11">
+              <a:extLst>
+                <a:ext uri="{FF2B5EF4-FFF2-40B4-BE49-F238E27FC236}">
+                  <a16:creationId xmlns:a16="http://schemas.microsoft.com/office/drawing/2014/main" id="{D84EB264-A8D8-C11F-A6E8-E72431364513}"/>
+                </a:ext>
+              </a:extLst>
+            </p:cNvPr>
+            <p:cNvSpPr txBox="1"/>
+            <p:nvPr/>
+          </p:nvSpPr>
+          <p:spPr>
+            <a:xfrm>
+              <a:off x="965755" y="326289"/>
+              <a:ext cx="3257938" cy="369332"/>
+            </a:xfrm>
+            <a:prstGeom prst="rect">
+              <a:avLst/>
+            </a:prstGeom>
+            <a:noFill/>
+          </p:spPr>
+          <p:txBody>
+            <a:bodyPr wrap="square" rtlCol="0">
+              <a:spAutoFit/>
+            </a:bodyPr>
+            <a:lstStyle/>
+            <a:p>
+              <a:pPr algn="ctr"/>
+              <a:r>
+                <a:rPr lang="nl-NL" b="1" dirty="0">
+                  <a:latin typeface="Times New Roman" panose="02020603050405020304" pitchFamily="18" charset="0"/>
+                  <a:cs typeface="Times New Roman" panose="02020603050405020304" pitchFamily="18" charset="0"/>
+                </a:rPr>
+                <a:t>Input sequence (ground truth)</a:t>
+              </a:r>
+            </a:p>
+          </p:txBody>
+        </p:sp>
+        <p:sp>
+          <p:nvSpPr>
+            <p:cNvPr id="13" name="TextBox 12">
+              <a:extLst>
+                <a:ext uri="{FF2B5EF4-FFF2-40B4-BE49-F238E27FC236}">
+                  <a16:creationId xmlns:a16="http://schemas.microsoft.com/office/drawing/2014/main" id="{EA571061-8EE1-26D1-D619-16CEC819DE20}"/>
+                </a:ext>
+              </a:extLst>
+            </p:cNvPr>
+            <p:cNvSpPr txBox="1"/>
+            <p:nvPr/>
+          </p:nvSpPr>
+          <p:spPr>
+            <a:xfrm>
+              <a:off x="1227299" y="2800013"/>
+              <a:ext cx="2734850" cy="369332"/>
+            </a:xfrm>
+            <a:prstGeom prst="rect">
+              <a:avLst/>
+            </a:prstGeom>
+            <a:noFill/>
+          </p:spPr>
+          <p:txBody>
+            <a:bodyPr wrap="square" rtlCol="0">
+              <a:spAutoFit/>
+            </a:bodyPr>
+            <a:lstStyle/>
+            <a:p>
+              <a:pPr algn="ctr"/>
+              <a:r>
+                <a:rPr lang="nl-NL" b="1" dirty="0">
+                  <a:latin typeface="Times New Roman" panose="02020603050405020304" pitchFamily="18" charset="0"/>
+                  <a:cs typeface="Times New Roman" panose="02020603050405020304" pitchFamily="18" charset="0"/>
+                </a:rPr>
+                <a:t>Input prompt (masked)</a:t>
+              </a:r>
+            </a:p>
+          </p:txBody>
+        </p:sp>
+        <p:sp>
+          <p:nvSpPr>
+            <p:cNvPr id="15" name="TextBox 14">
+              <a:extLst>
+                <a:ext uri="{FF2B5EF4-FFF2-40B4-BE49-F238E27FC236}">
+                  <a16:creationId xmlns:a16="http://schemas.microsoft.com/office/drawing/2014/main" id="{0AA17334-F3A9-2FC3-A0A0-23C7F0D3234E}"/>
+                </a:ext>
+              </a:extLst>
+            </p:cNvPr>
+            <p:cNvSpPr txBox="1"/>
+            <p:nvPr/>
+          </p:nvSpPr>
+          <p:spPr>
+            <a:xfrm>
+              <a:off x="4917256" y="3640286"/>
+              <a:ext cx="1606044" cy="584775"/>
+            </a:xfrm>
+            <a:prstGeom prst="rect">
+              <a:avLst/>
+            </a:prstGeom>
+            <a:noFill/>
+          </p:spPr>
+          <p:txBody>
+            <a:bodyPr wrap="square" rtlCol="0">
+              <a:spAutoFit/>
+            </a:bodyPr>
+            <a:lstStyle/>
+            <a:p>
+              <a:pPr algn="ctr"/>
+              <a:r>
+                <a:rPr lang="nl-NL" sz="1600" dirty="0">
+                  <a:latin typeface="Times New Roman" panose="02020603050405020304" pitchFamily="18" charset="0"/>
+                  <a:cs typeface="Times New Roman" panose="02020603050405020304" pitchFamily="18" charset="0"/>
+                </a:rPr>
+                <a:t>Model inference (fill-mask)</a:t>
+              </a:r>
+            </a:p>
+          </p:txBody>
+        </p:sp>
+        <p:cxnSp>
+          <p:nvCxnSpPr>
+            <p:cNvPr id="19" name="Straight Arrow Connector 18">
+              <a:extLst>
+                <a:ext uri="{FF2B5EF4-FFF2-40B4-BE49-F238E27FC236}">
+                  <a16:creationId xmlns:a16="http://schemas.microsoft.com/office/drawing/2014/main" id="{E3817176-79E9-5A04-47B7-55589381B7CD}"/>
+                </a:ext>
+              </a:extLst>
+            </p:cNvPr>
+            <p:cNvCxnSpPr>
+              <a:cxnSpLocks/>
+            </p:cNvCxnSpPr>
+            <p:nvPr/>
+          </p:nvCxnSpPr>
+          <p:spPr>
+            <a:xfrm>
+              <a:off x="5192155" y="3587411"/>
+              <a:ext cx="1056249" cy="0"/>
+            </a:xfrm>
+            <a:prstGeom prst="straightConnector1">
+              <a:avLst/>
+            </a:prstGeom>
+            <a:ln>
+              <a:tailEnd type="triangle"/>
+            </a:ln>
+          </p:spPr>
+          <p:style>
+            <a:lnRef idx="2">
+              <a:schemeClr val="dk1"/>
+            </a:lnRef>
+            <a:fillRef idx="0">
+              <a:schemeClr val="dk1"/>
+            </a:fillRef>
+            <a:effectRef idx="1">
+              <a:schemeClr val="dk1"/>
+            </a:effectRef>
+            <a:fontRef idx="minor">
+              <a:schemeClr val="tx1"/>
+            </a:fontRef>
+          </p:style>
+        </p:cxnSp>
+        <p:sp>
+          <p:nvSpPr>
+            <p:cNvPr id="22" name="TextBox 21">
+              <a:extLst>
+                <a:ext uri="{FF2B5EF4-FFF2-40B4-BE49-F238E27FC236}">
+                  <a16:creationId xmlns:a16="http://schemas.microsoft.com/office/drawing/2014/main" id="{EF3E60C5-9B16-6BEF-76F4-627835FB6F05}"/>
+                </a:ext>
+              </a:extLst>
+            </p:cNvPr>
+            <p:cNvSpPr txBox="1"/>
+            <p:nvPr/>
+          </p:nvSpPr>
+          <p:spPr>
+            <a:xfrm>
+              <a:off x="263324" y="708873"/>
+              <a:ext cx="4662802" cy="923330"/>
+            </a:xfrm>
+            <a:prstGeom prst="rect">
+              <a:avLst/>
+            </a:prstGeom>
+            <a:noFill/>
+            <a:ln>
+              <a:solidFill>
+                <a:schemeClr val="tx1"/>
+              </a:solidFill>
+            </a:ln>
+          </p:spPr>
+          <p:txBody>
+            <a:bodyPr wrap="square" rtlCol="0">
+              <a:spAutoFit/>
+            </a:bodyPr>
+            <a:lstStyle/>
+            <a:p>
+              <a:r>
+                <a:rPr lang="nl-NL" dirty="0">
+                  <a:latin typeface="Times New Roman" panose="02020603050405020304" pitchFamily="18" charset="0"/>
+                  <a:cs typeface="Times New Roman" panose="02020603050405020304" pitchFamily="18" charset="0"/>
+                </a:rPr>
+                <a:t>Wat zullen we eens eten vanavond? </a:t>
+              </a:r>
+              <a:r>
+                <a:rPr lang="nl-NL" dirty="0">
+                  <a:solidFill>
+                    <a:schemeClr val="bg1"/>
+                  </a:solidFill>
+                  <a:highlight>
+                    <a:srgbClr val="808080"/>
+                  </a:highlight>
+                  <a:latin typeface="Times New Roman" panose="02020603050405020304" pitchFamily="18" charset="0"/>
+                  <a:cs typeface="Times New Roman" panose="02020603050405020304" pitchFamily="18" charset="0"/>
+                </a:rPr>
+                <a:t>Elke dag in</a:t>
+              </a:r>
+              <a:r>
+                <a:rPr lang="nl-NL" dirty="0">
+                  <a:solidFill>
+                    <a:schemeClr val="bg1"/>
+                  </a:solidFill>
+                  <a:latin typeface="Times New Roman" panose="02020603050405020304" pitchFamily="18" charset="0"/>
+                  <a:cs typeface="Times New Roman" panose="02020603050405020304" pitchFamily="18" charset="0"/>
+                </a:rPr>
+                <a:t> </a:t>
+              </a:r>
+              <a:r>
+                <a:rPr lang="nl-NL" dirty="0">
+                  <a:latin typeface="Times New Roman" panose="02020603050405020304" pitchFamily="18" charset="0"/>
+                  <a:cs typeface="Times New Roman" panose="02020603050405020304" pitchFamily="18" charset="0"/>
+                </a:rPr>
+                <a:t>de Volkskrant een verrassend en smakelijk recept. Vandaag:</a:t>
+              </a:r>
+            </a:p>
+          </p:txBody>
+        </p:sp>
+        <p:sp>
+          <p:nvSpPr>
+            <p:cNvPr id="23" name="TextBox 22">
+              <a:extLst>
+                <a:ext uri="{FF2B5EF4-FFF2-40B4-BE49-F238E27FC236}">
+                  <a16:creationId xmlns:a16="http://schemas.microsoft.com/office/drawing/2014/main" id="{67A32EBC-4214-2B06-3C32-1669C4E38E74}"/>
+                </a:ext>
+              </a:extLst>
+            </p:cNvPr>
+            <p:cNvSpPr txBox="1"/>
+            <p:nvPr/>
+          </p:nvSpPr>
+          <p:spPr>
+            <a:xfrm>
+              <a:off x="263324" y="3178621"/>
+              <a:ext cx="4662804" cy="923330"/>
+            </a:xfrm>
+            <a:prstGeom prst="rect">
+              <a:avLst/>
+            </a:prstGeom>
+            <a:noFill/>
+            <a:ln>
+              <a:solidFill>
+                <a:schemeClr val="tx1"/>
+              </a:solidFill>
+            </a:ln>
+          </p:spPr>
+          <p:txBody>
+            <a:bodyPr wrap="square" rtlCol="0">
+              <a:spAutoFit/>
+            </a:bodyPr>
+            <a:lstStyle/>
+            <a:p>
+              <a:r>
+                <a:rPr lang="nl-NL" dirty="0">
+                  <a:latin typeface="Times New Roman" panose="02020603050405020304" pitchFamily="18" charset="0"/>
+                  <a:cs typeface="Times New Roman" panose="02020603050405020304" pitchFamily="18" charset="0"/>
+                </a:rPr>
+                <a:t>Wat zullen we eens eten vanavond? </a:t>
+              </a:r>
+              <a:r>
+                <a:rPr lang="nl-NL" dirty="0">
+                  <a:solidFill>
+                    <a:schemeClr val="bg1"/>
+                  </a:solidFill>
+                  <a:highlight>
+                    <a:srgbClr val="808080"/>
+                  </a:highlight>
+                  <a:latin typeface="Times New Roman" panose="02020603050405020304" pitchFamily="18" charset="0"/>
+                  <a:cs typeface="Times New Roman" panose="02020603050405020304" pitchFamily="18" charset="0"/>
+                </a:rPr>
+                <a:t>&lt;MASK_1&gt;</a:t>
+              </a:r>
+              <a:r>
+                <a:rPr lang="nl-NL" dirty="0">
+                  <a:solidFill>
+                    <a:schemeClr val="bg1"/>
+                  </a:solidFill>
+                  <a:latin typeface="Times New Roman" panose="02020603050405020304" pitchFamily="18" charset="0"/>
+                  <a:cs typeface="Times New Roman" panose="02020603050405020304" pitchFamily="18" charset="0"/>
+                </a:rPr>
+                <a:t> </a:t>
+              </a:r>
+              <a:r>
+                <a:rPr lang="nl-NL" dirty="0">
+                  <a:latin typeface="Times New Roman" panose="02020603050405020304" pitchFamily="18" charset="0"/>
+                  <a:cs typeface="Times New Roman" panose="02020603050405020304" pitchFamily="18" charset="0"/>
+                </a:rPr>
+                <a:t>de Volkskrant een verrassend en smakelijk recept. Vandaag:</a:t>
+              </a:r>
+            </a:p>
+          </p:txBody>
+        </p:sp>
+        <p:cxnSp>
+          <p:nvCxnSpPr>
+            <p:cNvPr id="24" name="Straight Arrow Connector 23">
+              <a:extLst>
+                <a:ext uri="{FF2B5EF4-FFF2-40B4-BE49-F238E27FC236}">
+                  <a16:creationId xmlns:a16="http://schemas.microsoft.com/office/drawing/2014/main" id="{899DE630-1CA4-0F75-6B78-88F277825719}"/>
+                </a:ext>
+              </a:extLst>
+            </p:cNvPr>
+            <p:cNvCxnSpPr>
+              <a:cxnSpLocks/>
+            </p:cNvCxnSpPr>
+            <p:nvPr/>
+          </p:nvCxnSpPr>
+          <p:spPr>
+            <a:xfrm>
+              <a:off x="2605276" y="1775487"/>
+              <a:ext cx="0" cy="996292"/>
+            </a:xfrm>
+            <a:prstGeom prst="straightConnector1">
+              <a:avLst/>
+            </a:prstGeom>
+            <a:ln>
+              <a:tailEnd type="triangle"/>
+            </a:ln>
+          </p:spPr>
+          <p:style>
+            <a:lnRef idx="2">
+              <a:schemeClr val="dk1"/>
+            </a:lnRef>
+            <a:fillRef idx="0">
+              <a:schemeClr val="dk1"/>
+            </a:fillRef>
+            <a:effectRef idx="1">
+              <a:schemeClr val="dk1"/>
+            </a:effectRef>
+            <a:fontRef idx="minor">
+              <a:schemeClr val="tx1"/>
+            </a:fontRef>
+          </p:style>
+        </p:cxnSp>
+        <p:sp>
+          <p:nvSpPr>
+            <p:cNvPr id="26" name="TextBox 25">
+              <a:extLst>
+                <a:ext uri="{FF2B5EF4-FFF2-40B4-BE49-F238E27FC236}">
+                  <a16:creationId xmlns:a16="http://schemas.microsoft.com/office/drawing/2014/main" id="{06EAAABE-2D20-AF6D-6D9D-B30EE7500364}"/>
+                </a:ext>
+              </a:extLst>
+            </p:cNvPr>
+            <p:cNvSpPr txBox="1"/>
+            <p:nvPr/>
+          </p:nvSpPr>
+          <p:spPr>
+            <a:xfrm>
+              <a:off x="6530626" y="360399"/>
+              <a:ext cx="2129673" cy="646331"/>
+            </a:xfrm>
+            <a:prstGeom prst="rect">
+              <a:avLst/>
+            </a:prstGeom>
+            <a:noFill/>
+          </p:spPr>
+          <p:txBody>
+            <a:bodyPr wrap="square" rtlCol="0">
+              <a:spAutoFit/>
+            </a:bodyPr>
+            <a:lstStyle/>
+            <a:p>
+              <a:pPr algn="ctr"/>
+              <a:r>
+                <a:rPr lang="nl-NL" b="1" noProof="1">
+                  <a:latin typeface="Times New Roman" panose="02020603050405020304" pitchFamily="18" charset="0"/>
+                  <a:cs typeface="Times New Roman" panose="02020603050405020304" pitchFamily="18" charset="0"/>
+                </a:rPr>
+                <a:t>Masked input tokens</a:t>
+              </a:r>
+            </a:p>
+          </p:txBody>
+        </p:sp>
+        <p:sp>
+          <p:nvSpPr>
+            <p:cNvPr id="27" name="TextBox 26">
+              <a:extLst>
+                <a:ext uri="{FF2B5EF4-FFF2-40B4-BE49-F238E27FC236}">
+                  <a16:creationId xmlns:a16="http://schemas.microsoft.com/office/drawing/2014/main" id="{34B6ABE2-5B2C-5655-2CF8-E57F52E9EA23}"/>
+                </a:ext>
+              </a:extLst>
+            </p:cNvPr>
+            <p:cNvSpPr txBox="1"/>
+            <p:nvPr/>
+          </p:nvSpPr>
+          <p:spPr>
+            <a:xfrm>
+              <a:off x="6530626" y="951092"/>
+              <a:ext cx="2129673" cy="369332"/>
+            </a:xfrm>
+            <a:prstGeom prst="rect">
+              <a:avLst/>
+            </a:prstGeom>
+            <a:noFill/>
+            <a:ln>
+              <a:solidFill>
+                <a:schemeClr val="tx1"/>
+              </a:solidFill>
+            </a:ln>
+          </p:spPr>
+          <p:txBody>
+            <a:bodyPr wrap="square" rtlCol="0">
+              <a:spAutoFit/>
+            </a:bodyPr>
+            <a:lstStyle/>
+            <a:p>
+              <a:r>
+                <a:rPr lang="nl-NL" dirty="0">
+                  <a:latin typeface="Times New Roman" panose="02020603050405020304" pitchFamily="18" charset="0"/>
+                  <a:cs typeface="Times New Roman" panose="02020603050405020304" pitchFamily="18" charset="0"/>
+                </a:rPr>
+                <a:t>[Elke dag in]</a:t>
+              </a:r>
+            </a:p>
+          </p:txBody>
+        </p:sp>
+        <p:sp>
+          <p:nvSpPr>
+            <p:cNvPr id="28" name="TextBox 27">
+              <a:extLst>
+                <a:ext uri="{FF2B5EF4-FFF2-40B4-BE49-F238E27FC236}">
+                  <a16:creationId xmlns:a16="http://schemas.microsoft.com/office/drawing/2014/main" id="{91FE7876-A842-A7F2-F8B5-DF58F160B258}"/>
+                </a:ext>
+              </a:extLst>
+            </p:cNvPr>
+            <p:cNvSpPr txBox="1"/>
+            <p:nvPr/>
+          </p:nvSpPr>
+          <p:spPr>
+            <a:xfrm>
+              <a:off x="6530627" y="3382867"/>
+              <a:ext cx="2129672" cy="369332"/>
+            </a:xfrm>
+            <a:prstGeom prst="rect">
+              <a:avLst/>
+            </a:prstGeom>
+            <a:noFill/>
+            <a:ln>
+              <a:solidFill>
+                <a:schemeClr val="tx1"/>
+              </a:solidFill>
+            </a:ln>
+          </p:spPr>
+          <p:txBody>
+            <a:bodyPr wrap="square" rtlCol="0">
+              <a:spAutoFit/>
+            </a:bodyPr>
+            <a:lstStyle/>
+            <a:p>
+              <a:r>
+                <a:rPr lang="nl-NL" dirty="0">
+                  <a:latin typeface="Times New Roman" panose="02020603050405020304" pitchFamily="18" charset="0"/>
+                  <a:cs typeface="Times New Roman" panose="02020603050405020304" pitchFamily="18" charset="0"/>
+                </a:rPr>
+                <a:t>[Elke dag publiceert]</a:t>
+              </a:r>
+            </a:p>
+          </p:txBody>
+        </p:sp>
+        <p:sp>
+          <p:nvSpPr>
+            <p:cNvPr id="29" name="TextBox 28">
+              <a:extLst>
+                <a:ext uri="{FF2B5EF4-FFF2-40B4-BE49-F238E27FC236}">
+                  <a16:creationId xmlns:a16="http://schemas.microsoft.com/office/drawing/2014/main" id="{CCD6794F-E6F9-7888-C44B-A07797FC23B8}"/>
+                </a:ext>
+              </a:extLst>
+            </p:cNvPr>
+            <p:cNvSpPr txBox="1"/>
+            <p:nvPr/>
+          </p:nvSpPr>
+          <p:spPr>
+            <a:xfrm>
+              <a:off x="6530626" y="2792174"/>
+              <a:ext cx="2384977" cy="646331"/>
+            </a:xfrm>
+            <a:prstGeom prst="rect">
+              <a:avLst/>
+            </a:prstGeom>
+            <a:noFill/>
+          </p:spPr>
+          <p:txBody>
+            <a:bodyPr wrap="square" rtlCol="0">
+              <a:spAutoFit/>
+            </a:bodyPr>
+            <a:lstStyle/>
+            <a:p>
+              <a:pPr algn="ctr"/>
+              <a:r>
+                <a:rPr lang="nl-NL" b="1" noProof="1">
+                  <a:latin typeface="Times New Roman" panose="02020603050405020304" pitchFamily="18" charset="0"/>
+                  <a:cs typeface="Times New Roman" panose="02020603050405020304" pitchFamily="18" charset="0"/>
+                </a:rPr>
+                <a:t>Model generated tokens</a:t>
+              </a:r>
+            </a:p>
+          </p:txBody>
+        </p:sp>
+        <p:sp>
+          <p:nvSpPr>
+            <p:cNvPr id="30" name="TextBox 29">
+              <a:extLst>
+                <a:ext uri="{FF2B5EF4-FFF2-40B4-BE49-F238E27FC236}">
+                  <a16:creationId xmlns:a16="http://schemas.microsoft.com/office/drawing/2014/main" id="{70ADC0D6-FEE6-E1B9-62E5-87B9B552F38F}"/>
+                </a:ext>
+              </a:extLst>
+            </p:cNvPr>
+            <p:cNvSpPr txBox="1"/>
+            <p:nvPr/>
+          </p:nvSpPr>
+          <p:spPr>
+            <a:xfrm>
+              <a:off x="9065649" y="2487887"/>
+              <a:ext cx="2291463" cy="369332"/>
+            </a:xfrm>
+            <a:prstGeom prst="rect">
+              <a:avLst/>
+            </a:prstGeom>
+            <a:noFill/>
+            <a:ln>
+              <a:solidFill>
+                <a:schemeClr val="tx1"/>
+              </a:solidFill>
+            </a:ln>
+          </p:spPr>
+          <p:txBody>
+            <a:bodyPr wrap="square" rtlCol="0">
+              <a:spAutoFit/>
+            </a:bodyPr>
+            <a:lstStyle/>
+            <a:p>
+              <a:r>
+                <a:rPr lang="nl-NL" dirty="0">
+                  <a:latin typeface="Times New Roman" panose="02020603050405020304" pitchFamily="18" charset="0"/>
+                  <a:cs typeface="Times New Roman" panose="02020603050405020304" pitchFamily="18" charset="0"/>
+                </a:rPr>
+                <a:t>0.47</a:t>
+              </a:r>
+            </a:p>
+          </p:txBody>
+        </p:sp>
+        <p:sp>
+          <p:nvSpPr>
+            <p:cNvPr id="31" name="TextBox 30">
+              <a:extLst>
+                <a:ext uri="{FF2B5EF4-FFF2-40B4-BE49-F238E27FC236}">
+                  <a16:creationId xmlns:a16="http://schemas.microsoft.com/office/drawing/2014/main" id="{14BEDDD3-C124-B870-F3D7-AD28544731F8}"/>
+                </a:ext>
+              </a:extLst>
+            </p:cNvPr>
+            <p:cNvSpPr txBox="1"/>
+            <p:nvPr/>
+          </p:nvSpPr>
+          <p:spPr>
+            <a:xfrm>
+              <a:off x="9065656" y="1808725"/>
+              <a:ext cx="2291464" cy="646331"/>
+            </a:xfrm>
+            <a:prstGeom prst="rect">
+              <a:avLst/>
+            </a:prstGeom>
+            <a:noFill/>
+          </p:spPr>
+          <p:txBody>
+            <a:bodyPr wrap="square" rtlCol="0">
+              <a:spAutoFit/>
+            </a:bodyPr>
+            <a:lstStyle/>
+            <a:p>
+              <a:pPr algn="ctr"/>
+              <a:r>
+                <a:rPr lang="nl-NL" b="1" noProof="1">
+                  <a:latin typeface="Times New Roman" panose="02020603050405020304" pitchFamily="18" charset="0"/>
+                  <a:cs typeface="Times New Roman" panose="02020603050405020304" pitchFamily="18" charset="0"/>
+                </a:rPr>
+                <a:t>Levenshtein distance (normalized)</a:t>
+              </a:r>
+            </a:p>
+          </p:txBody>
+        </p:sp>
+        <p:cxnSp>
+          <p:nvCxnSpPr>
+            <p:cNvPr id="32" name="Straight Arrow Connector 31">
+              <a:extLst>
+                <a:ext uri="{FF2B5EF4-FFF2-40B4-BE49-F238E27FC236}">
+                  <a16:creationId xmlns:a16="http://schemas.microsoft.com/office/drawing/2014/main" id="{77C8BB9E-5BCC-C951-5203-FB91D4C68AFB}"/>
+                </a:ext>
+              </a:extLst>
+            </p:cNvPr>
+            <p:cNvCxnSpPr>
+              <a:cxnSpLocks/>
+            </p:cNvCxnSpPr>
+            <p:nvPr/>
+          </p:nvCxnSpPr>
+          <p:spPr>
+            <a:xfrm>
+              <a:off x="5192154" y="1162260"/>
+              <a:ext cx="1056249" cy="0"/>
+            </a:xfrm>
+            <a:prstGeom prst="straightConnector1">
+              <a:avLst/>
+            </a:prstGeom>
+            <a:ln>
+              <a:tailEnd type="triangle"/>
+            </a:ln>
+          </p:spPr>
+          <p:style>
+            <a:lnRef idx="2">
+              <a:schemeClr val="dk1"/>
+            </a:lnRef>
+            <a:fillRef idx="0">
+              <a:schemeClr val="dk1"/>
+            </a:fillRef>
+            <a:effectRef idx="1">
+              <a:schemeClr val="dk1"/>
+            </a:effectRef>
+            <a:fontRef idx="minor">
+              <a:schemeClr val="tx1"/>
+            </a:fontRef>
+          </p:style>
+        </p:cxnSp>
+        <p:cxnSp>
+          <p:nvCxnSpPr>
+            <p:cNvPr id="33" name="Straight Arrow Connector 32">
+              <a:extLst>
+                <a:ext uri="{FF2B5EF4-FFF2-40B4-BE49-F238E27FC236}">
+                  <a16:creationId xmlns:a16="http://schemas.microsoft.com/office/drawing/2014/main" id="{A285B488-A958-C128-7D02-54DA31B3E29C}"/>
+                </a:ext>
+              </a:extLst>
+            </p:cNvPr>
+            <p:cNvCxnSpPr>
+              <a:cxnSpLocks/>
+            </p:cNvCxnSpPr>
+            <p:nvPr/>
+          </p:nvCxnSpPr>
+          <p:spPr>
+            <a:xfrm>
+              <a:off x="8756994" y="1170538"/>
+              <a:ext cx="309600" cy="320400"/>
+            </a:xfrm>
+            <a:prstGeom prst="straightConnector1">
+              <a:avLst/>
+            </a:prstGeom>
+            <a:ln>
+              <a:tailEnd type="triangle"/>
+            </a:ln>
+          </p:spPr>
+          <p:style>
+            <a:lnRef idx="2">
+              <a:schemeClr val="dk1"/>
+            </a:lnRef>
+            <a:fillRef idx="0">
+              <a:schemeClr val="dk1"/>
+            </a:fillRef>
+            <a:effectRef idx="1">
+              <a:schemeClr val="dk1"/>
+            </a:effectRef>
+            <a:fontRef idx="minor">
+              <a:schemeClr val="tx1"/>
+            </a:fontRef>
+          </p:style>
+        </p:cxnSp>
+        <p:cxnSp>
+          <p:nvCxnSpPr>
+            <p:cNvPr id="35" name="Straight Arrow Connector 34">
+              <a:extLst>
+                <a:ext uri="{FF2B5EF4-FFF2-40B4-BE49-F238E27FC236}">
+                  <a16:creationId xmlns:a16="http://schemas.microsoft.com/office/drawing/2014/main" id="{27722FB4-9689-0075-34A2-2529A2BAD347}"/>
+                </a:ext>
+              </a:extLst>
+            </p:cNvPr>
+            <p:cNvCxnSpPr>
+              <a:cxnSpLocks/>
+            </p:cNvCxnSpPr>
+            <p:nvPr/>
+          </p:nvCxnSpPr>
+          <p:spPr>
+            <a:xfrm flipV="1">
+              <a:off x="8756995" y="3243690"/>
+              <a:ext cx="308661" cy="320336"/>
+            </a:xfrm>
+            <a:prstGeom prst="straightConnector1">
+              <a:avLst/>
+            </a:prstGeom>
+            <a:ln>
+              <a:tailEnd type="triangle"/>
+            </a:ln>
+          </p:spPr>
+          <p:style>
+            <a:lnRef idx="2">
+              <a:schemeClr val="dk1"/>
+            </a:lnRef>
+            <a:fillRef idx="0">
+              <a:schemeClr val="dk1"/>
+            </a:fillRef>
+            <a:effectRef idx="1">
+              <a:schemeClr val="dk1"/>
+            </a:effectRef>
+            <a:fontRef idx="minor">
+              <a:schemeClr val="tx1"/>
+            </a:fontRef>
+          </p:style>
+        </p:cxnSp>
+      </p:grpSp>
+      <p:grpSp>
+        <p:nvGrpSpPr>
+          <p:cNvPr id="8" name="Group 7">
+            <a:extLst>
+              <a:ext uri="{FF2B5EF4-FFF2-40B4-BE49-F238E27FC236}">
+                <a16:creationId xmlns:a16="http://schemas.microsoft.com/office/drawing/2014/main" id="{CBA1E30B-1803-B972-53E7-54C2F092C300}"/>
+              </a:ext>
+            </a:extLst>
+          </p:cNvPr>
+          <p:cNvGrpSpPr/>
           <p:nvPr/>
-        </p:nvSpPr>
-        <p:spPr>
+        </p:nvGrpSpPr>
+        <p:grpSpPr>
           <a:xfrm>
-            <a:off x="965755" y="326289"/>
-            <a:ext cx="3257938" cy="369332"/>
+            <a:off x="263324" y="4670575"/>
+            <a:ext cx="11093788" cy="1973379"/>
+            <a:chOff x="263324" y="4670575"/>
+            <a:chExt cx="11093788" cy="1973379"/>
           </a:xfrm>
-          <a:prstGeom prst="rect">
-            <a:avLst/>
-          </a:prstGeom>
-          <a:noFill/>
-        </p:spPr>
-        <p:txBody>
-          <a:bodyPr wrap="square" rtlCol="0">
-            <a:spAutoFit/>
-          </a:bodyPr>
-          <a:lstStyle/>
-          <a:p>
-            <a:pPr algn="ctr"/>
-            <a:r>
-              <a:rPr lang="nl-NL" b="1" dirty="0">
-                <a:latin typeface="Times New Roman" panose="02020603050405020304" pitchFamily="18" charset="0"/>
-                <a:cs typeface="Times New Roman" panose="02020603050405020304" pitchFamily="18" charset="0"/>
-              </a:rPr>
-              <a:t>Input sequence (ground truth)</a:t>
-            </a:r>
-          </a:p>
-        </p:txBody>
-      </p:sp>
-      <p:sp>
-        <p:nvSpPr>
-          <p:cNvPr id="13" name="TextBox 12">
-            <a:extLst>
-              <a:ext uri="{FF2B5EF4-FFF2-40B4-BE49-F238E27FC236}">
-                <a16:creationId xmlns:a16="http://schemas.microsoft.com/office/drawing/2014/main" id="{EA571061-8EE1-26D1-D619-16CEC819DE20}"/>
-              </a:ext>
-            </a:extLst>
-          </p:cNvPr>
-          <p:cNvSpPr txBox="1"/>
-          <p:nvPr/>
-        </p:nvSpPr>
-        <p:spPr>
-          <a:xfrm>
-            <a:off x="1227299" y="2800013"/>
-            <a:ext cx="2734850" cy="369332"/>
-          </a:xfrm>
-          <a:prstGeom prst="rect">
-            <a:avLst/>
-          </a:prstGeom>
-          <a:noFill/>
-        </p:spPr>
-        <p:txBody>
-          <a:bodyPr wrap="square" rtlCol="0">
-            <a:spAutoFit/>
-          </a:bodyPr>
-          <a:lstStyle/>
-          <a:p>
-            <a:pPr algn="ctr"/>
-            <a:r>
-              <a:rPr lang="nl-NL" b="1" dirty="0">
-                <a:latin typeface="Times New Roman" panose="02020603050405020304" pitchFamily="18" charset="0"/>
-                <a:cs typeface="Times New Roman" panose="02020603050405020304" pitchFamily="18" charset="0"/>
-              </a:rPr>
-              <a:t>Input prompt (masked)</a:t>
-            </a:r>
-          </a:p>
-        </p:txBody>
-      </p:sp>
-      <p:sp>
-        <p:nvSpPr>
-          <p:cNvPr id="15" name="TextBox 14">
-            <a:extLst>
-              <a:ext uri="{FF2B5EF4-FFF2-40B4-BE49-F238E27FC236}">
-                <a16:creationId xmlns:a16="http://schemas.microsoft.com/office/drawing/2014/main" id="{0AA17334-F3A9-2FC3-A0A0-23C7F0D3234E}"/>
-              </a:ext>
-            </a:extLst>
-          </p:cNvPr>
-          <p:cNvSpPr txBox="1"/>
-          <p:nvPr/>
-        </p:nvSpPr>
-        <p:spPr>
-          <a:xfrm>
-            <a:off x="4917256" y="3640286"/>
-            <a:ext cx="1606044" cy="584775"/>
-          </a:xfrm>
-          <a:prstGeom prst="rect">
-            <a:avLst/>
-          </a:prstGeom>
-          <a:noFill/>
-        </p:spPr>
-        <p:txBody>
-          <a:bodyPr wrap="square" rtlCol="0">
-            <a:spAutoFit/>
-          </a:bodyPr>
-          <a:lstStyle/>
-          <a:p>
-            <a:pPr algn="ctr"/>
-            <a:r>
-              <a:rPr lang="nl-NL" sz="1600" dirty="0">
-                <a:latin typeface="Times New Roman" panose="02020603050405020304" pitchFamily="18" charset="0"/>
-                <a:cs typeface="Times New Roman" panose="02020603050405020304" pitchFamily="18" charset="0"/>
-              </a:rPr>
-              <a:t>Model inference (fill-mask)</a:t>
-            </a:r>
-          </a:p>
-        </p:txBody>
-      </p:sp>
-      <p:cxnSp>
-        <p:nvCxnSpPr>
-          <p:cNvPr id="19" name="Straight Arrow Connector 18">
-            <a:extLst>
-              <a:ext uri="{FF2B5EF4-FFF2-40B4-BE49-F238E27FC236}">
-                <a16:creationId xmlns:a16="http://schemas.microsoft.com/office/drawing/2014/main" id="{E3817176-79E9-5A04-47B7-55589381B7CD}"/>
-              </a:ext>
-            </a:extLst>
-          </p:cNvPr>
-          <p:cNvCxnSpPr>
-            <a:cxnSpLocks/>
-          </p:cNvCxnSpPr>
-          <p:nvPr/>
-        </p:nvCxnSpPr>
-        <p:spPr>
-          <a:xfrm>
-            <a:off x="5192155" y="3587411"/>
-            <a:ext cx="1056249" cy="0"/>
-          </a:xfrm>
-          <a:prstGeom prst="straightConnector1">
-            <a:avLst/>
-          </a:prstGeom>
-          <a:ln>
-            <a:tailEnd type="triangle"/>
-          </a:ln>
-        </p:spPr>
-        <p:style>
-          <a:lnRef idx="2">
-            <a:schemeClr val="dk1"/>
-          </a:lnRef>
-          <a:fillRef idx="0">
-            <a:schemeClr val="dk1"/>
-          </a:fillRef>
-          <a:effectRef idx="1">
-            <a:schemeClr val="dk1"/>
-          </a:effectRef>
-          <a:fontRef idx="minor">
-            <a:schemeClr val="tx1"/>
-          </a:fontRef>
-        </p:style>
-      </p:cxnSp>
-      <p:sp>
-        <p:nvSpPr>
-          <p:cNvPr id="22" name="TextBox 21">
-            <a:extLst>
-              <a:ext uri="{FF2B5EF4-FFF2-40B4-BE49-F238E27FC236}">
-                <a16:creationId xmlns:a16="http://schemas.microsoft.com/office/drawing/2014/main" id="{EF3E60C5-9B16-6BEF-76F4-627835FB6F05}"/>
-              </a:ext>
-            </a:extLst>
-          </p:cNvPr>
-          <p:cNvSpPr txBox="1"/>
-          <p:nvPr/>
-        </p:nvSpPr>
-        <p:spPr>
-          <a:xfrm>
-            <a:off x="263324" y="708873"/>
-            <a:ext cx="4662802" cy="923330"/>
-          </a:xfrm>
-          <a:prstGeom prst="rect">
-            <a:avLst/>
-          </a:prstGeom>
-          <a:noFill/>
-          <a:ln>
-            <a:solidFill>
+        </p:grpSpPr>
+        <p:sp>
+          <p:nvSpPr>
+            <p:cNvPr id="3" name="TextBox 2">
+              <a:extLst>
+                <a:ext uri="{FF2B5EF4-FFF2-40B4-BE49-F238E27FC236}">
+                  <a16:creationId xmlns:a16="http://schemas.microsoft.com/office/drawing/2014/main" id="{209E6910-EC4E-397F-B347-4783A4733C16}"/>
+                </a:ext>
+              </a:extLst>
+            </p:cNvPr>
+            <p:cNvSpPr txBox="1"/>
+            <p:nvPr/>
+          </p:nvSpPr>
+          <p:spPr>
+            <a:xfrm>
+              <a:off x="263324" y="4670575"/>
+              <a:ext cx="11093788" cy="646331"/>
+            </a:xfrm>
+            <a:prstGeom prst="rect">
+              <a:avLst/>
+            </a:prstGeom>
+            <a:noFill/>
+            <a:ln>
+              <a:solidFill>
+                <a:schemeClr val="tx1"/>
+              </a:solidFill>
+            </a:ln>
+          </p:spPr>
+          <p:txBody>
+            <a:bodyPr wrap="square" rtlCol="0">
+              <a:spAutoFit/>
+            </a:bodyPr>
+            <a:lstStyle/>
+            <a:p>
+              <a:r>
+                <a:rPr lang="nl-NL" dirty="0">
+                  <a:latin typeface="Times New Roman" panose="02020603050405020304" pitchFamily="18" charset="0"/>
+                  <a:cs typeface="Times New Roman" panose="02020603050405020304" pitchFamily="18" charset="0"/>
+                </a:rPr>
+                <a:t>Het WK dendert in volle vaart door. Vandaag staan er opnieuw drie wedstrijden op het programma. Uiteraard zijn deze duels in een apart </a:t>
+              </a:r>
+              <a:r>
+                <a:rPr lang="nl-NL" dirty="0">
+                  <a:solidFill>
+                    <a:schemeClr val="bg1"/>
+                  </a:solidFill>
+                  <a:highlight>
+                    <a:srgbClr val="808080"/>
+                  </a:highlight>
+                  <a:latin typeface="Times New Roman" panose="02020603050405020304" pitchFamily="18" charset="0"/>
+                  <a:cs typeface="Times New Roman" panose="02020603050405020304" pitchFamily="18" charset="0"/>
+                </a:rPr>
+                <a:t>liveblog te volgen.</a:t>
+              </a:r>
+              <a:r>
+                <a:rPr lang="nl-NL" dirty="0">
+                  <a:solidFill>
+                    <a:schemeClr val="bg1"/>
+                  </a:solidFill>
+                  <a:latin typeface="Times New Roman" panose="02020603050405020304" pitchFamily="18" charset="0"/>
+                  <a:cs typeface="Times New Roman" panose="02020603050405020304" pitchFamily="18" charset="0"/>
+                </a:rPr>
+                <a:t> </a:t>
+              </a:r>
+              <a:r>
+                <a:rPr lang="nl-NL" dirty="0">
+                  <a:latin typeface="Times New Roman" panose="02020603050405020304" pitchFamily="18" charset="0"/>
+                  <a:cs typeface="Times New Roman" panose="02020603050405020304" pitchFamily="18" charset="0"/>
+                </a:rPr>
+                <a:t>Hier brengen </a:t>
+              </a:r>
+              <a:r>
+                <a:rPr lang="nl-NL" dirty="0">
+                  <a:solidFill>
+                    <a:schemeClr val="bg1"/>
+                  </a:solidFill>
+                  <a:highlight>
+                    <a:srgbClr val="808080"/>
+                  </a:highlight>
+                  <a:latin typeface="Times New Roman" panose="02020603050405020304" pitchFamily="18" charset="0"/>
+                  <a:cs typeface="Times New Roman" panose="02020603050405020304" pitchFamily="18" charset="0"/>
+                </a:rPr>
+                <a:t>we je op</a:t>
+              </a:r>
+              <a:r>
+                <a:rPr lang="nl-NL" dirty="0">
+                  <a:solidFill>
+                    <a:schemeClr val="bg1"/>
+                  </a:solidFill>
+                  <a:latin typeface="Times New Roman" panose="02020603050405020304" pitchFamily="18" charset="0"/>
+                  <a:cs typeface="Times New Roman" panose="02020603050405020304" pitchFamily="18" charset="0"/>
+                </a:rPr>
+                <a:t> </a:t>
+              </a:r>
+              <a:r>
+                <a:rPr lang="nl-NL" dirty="0">
+                  <a:latin typeface="Times New Roman" panose="02020603050405020304" pitchFamily="18" charset="0"/>
+                  <a:cs typeface="Times New Roman" panose="02020603050405020304" pitchFamily="18" charset="0"/>
+                </a:rPr>
+                <a:t>de hoogte van al het overige WK-nieuws.</a:t>
+              </a:r>
+            </a:p>
+          </p:txBody>
+        </p:sp>
+        <p:sp>
+          <p:nvSpPr>
+            <p:cNvPr id="4" name="TextBox 3">
+              <a:extLst>
+                <a:ext uri="{FF2B5EF4-FFF2-40B4-BE49-F238E27FC236}">
+                  <a16:creationId xmlns:a16="http://schemas.microsoft.com/office/drawing/2014/main" id="{C4549261-A83D-4A51-E8F3-479C0FFAEB35}"/>
+                </a:ext>
+              </a:extLst>
+            </p:cNvPr>
+            <p:cNvSpPr txBox="1"/>
+            <p:nvPr/>
+          </p:nvSpPr>
+          <p:spPr>
+            <a:xfrm>
+              <a:off x="263324" y="5997623"/>
+              <a:ext cx="11093788" cy="646331"/>
+            </a:xfrm>
+            <a:prstGeom prst="rect">
+              <a:avLst/>
+            </a:prstGeom>
+            <a:noFill/>
+            <a:ln>
+              <a:solidFill>
+                <a:schemeClr val="tx1"/>
+              </a:solidFill>
+            </a:ln>
+          </p:spPr>
+          <p:txBody>
+            <a:bodyPr wrap="square" rtlCol="0">
+              <a:spAutoFit/>
+            </a:bodyPr>
+            <a:lstStyle/>
+            <a:p>
+              <a:r>
+                <a:rPr lang="nl-NL" dirty="0">
+                  <a:latin typeface="Times New Roman" panose="02020603050405020304" pitchFamily="18" charset="0"/>
+                  <a:cs typeface="Times New Roman" panose="02020603050405020304" pitchFamily="18" charset="0"/>
+                </a:rPr>
+                <a:t>Het WK dendert in volle vaart door. Vandaag staan er opnieuw drie wedstrijden op het programma. Uiteraard zijn deze duels in een apart </a:t>
+              </a:r>
+              <a:r>
+                <a:rPr lang="nl-NL" dirty="0">
+                  <a:solidFill>
+                    <a:schemeClr val="bg1"/>
+                  </a:solidFill>
+                  <a:highlight>
+                    <a:srgbClr val="808080"/>
+                  </a:highlight>
+                  <a:latin typeface="Times New Roman" panose="02020603050405020304" pitchFamily="18" charset="0"/>
+                  <a:cs typeface="Times New Roman" panose="02020603050405020304" pitchFamily="18" charset="0"/>
+                </a:rPr>
+                <a:t>&lt;MASK_1&gt;</a:t>
+              </a:r>
+              <a:r>
+                <a:rPr lang="nl-NL" dirty="0">
+                  <a:solidFill>
+                    <a:schemeClr val="bg1"/>
+                  </a:solidFill>
+                  <a:latin typeface="Times New Roman" panose="02020603050405020304" pitchFamily="18" charset="0"/>
+                  <a:cs typeface="Times New Roman" panose="02020603050405020304" pitchFamily="18" charset="0"/>
+                </a:rPr>
+                <a:t> </a:t>
+              </a:r>
+              <a:r>
+                <a:rPr lang="nl-NL" dirty="0">
+                  <a:latin typeface="Times New Roman" panose="02020603050405020304" pitchFamily="18" charset="0"/>
+                  <a:cs typeface="Times New Roman" panose="02020603050405020304" pitchFamily="18" charset="0"/>
+                </a:rPr>
+                <a:t>Hier brengen </a:t>
+              </a:r>
+              <a:r>
+                <a:rPr lang="nl-NL" dirty="0">
+                  <a:solidFill>
+                    <a:schemeClr val="bg1"/>
+                  </a:solidFill>
+                  <a:highlight>
+                    <a:srgbClr val="808080"/>
+                  </a:highlight>
+                  <a:latin typeface="Times New Roman" panose="02020603050405020304" pitchFamily="18" charset="0"/>
+                  <a:cs typeface="Times New Roman" panose="02020603050405020304" pitchFamily="18" charset="0"/>
+                </a:rPr>
+                <a:t>&lt;MASK_2&gt;</a:t>
+              </a:r>
+              <a:r>
+                <a:rPr lang="nl-NL" dirty="0">
+                  <a:solidFill>
+                    <a:schemeClr val="bg1"/>
+                  </a:solidFill>
+                  <a:latin typeface="Times New Roman" panose="02020603050405020304" pitchFamily="18" charset="0"/>
+                  <a:cs typeface="Times New Roman" panose="02020603050405020304" pitchFamily="18" charset="0"/>
+                </a:rPr>
+                <a:t> </a:t>
+              </a:r>
+              <a:r>
+                <a:rPr lang="nl-NL" dirty="0">
+                  <a:latin typeface="Times New Roman" panose="02020603050405020304" pitchFamily="18" charset="0"/>
+                  <a:cs typeface="Times New Roman" panose="02020603050405020304" pitchFamily="18" charset="0"/>
+                </a:rPr>
+                <a:t>de hoogte van al het overige WK-nieuws.</a:t>
+              </a:r>
+            </a:p>
+          </p:txBody>
+        </p:sp>
+        <p:cxnSp>
+          <p:nvCxnSpPr>
+            <p:cNvPr id="5" name="Straight Arrow Connector 4">
+              <a:extLst>
+                <a:ext uri="{FF2B5EF4-FFF2-40B4-BE49-F238E27FC236}">
+                  <a16:creationId xmlns:a16="http://schemas.microsoft.com/office/drawing/2014/main" id="{1B30C40A-05CB-0CB2-E89B-E7E124E08465}"/>
+                </a:ext>
+              </a:extLst>
+            </p:cNvPr>
+            <p:cNvCxnSpPr>
+              <a:cxnSpLocks/>
+            </p:cNvCxnSpPr>
+            <p:nvPr/>
+          </p:nvCxnSpPr>
+          <p:spPr>
+            <a:xfrm>
+              <a:off x="5176644" y="5454891"/>
+              <a:ext cx="0" cy="415391"/>
+            </a:xfrm>
+            <a:prstGeom prst="straightConnector1">
+              <a:avLst/>
+            </a:prstGeom>
+            <a:ln>
+              <a:tailEnd type="triangle"/>
+            </a:ln>
+          </p:spPr>
+          <p:style>
+            <a:lnRef idx="2">
+              <a:schemeClr val="dk1"/>
+            </a:lnRef>
+            <a:fillRef idx="0">
+              <a:schemeClr val="dk1"/>
+            </a:fillRef>
+            <a:effectRef idx="1">
+              <a:schemeClr val="dk1"/>
+            </a:effectRef>
+            <a:fontRef idx="minor">
               <a:schemeClr val="tx1"/>
-            </a:solidFill>
-          </a:ln>
-        </p:spPr>
-        <p:txBody>
-          <a:bodyPr wrap="square" rtlCol="0">
-            <a:spAutoFit/>
-          </a:bodyPr>
-          <a:lstStyle/>
-          <a:p>
-            <a:r>
-              <a:rPr lang="nl-NL" i="1" dirty="0">
-                <a:latin typeface="Times New Roman" panose="02020603050405020304" pitchFamily="18" charset="0"/>
-                <a:cs typeface="Times New Roman" panose="02020603050405020304" pitchFamily="18" charset="0"/>
-              </a:rPr>
-              <a:t>Wat zullen we eens eten vanavond? </a:t>
-            </a:r>
-            <a:r>
-              <a:rPr lang="nl-NL" i="1" u="sng" dirty="0">
-                <a:latin typeface="Times New Roman" panose="02020603050405020304" pitchFamily="18" charset="0"/>
-                <a:cs typeface="Times New Roman" panose="02020603050405020304" pitchFamily="18" charset="0"/>
-              </a:rPr>
-              <a:t>Elke dag in </a:t>
-            </a:r>
-            <a:r>
-              <a:rPr lang="nl-NL" i="1" dirty="0">
-                <a:latin typeface="Times New Roman" panose="02020603050405020304" pitchFamily="18" charset="0"/>
-                <a:cs typeface="Times New Roman" panose="02020603050405020304" pitchFamily="18" charset="0"/>
-              </a:rPr>
-              <a:t>de Volkskrant een verrassend en smakelijk recept. Vandaag:</a:t>
-            </a:r>
-          </a:p>
-        </p:txBody>
-      </p:sp>
-      <p:sp>
-        <p:nvSpPr>
-          <p:cNvPr id="23" name="TextBox 22">
-            <a:extLst>
-              <a:ext uri="{FF2B5EF4-FFF2-40B4-BE49-F238E27FC236}">
-                <a16:creationId xmlns:a16="http://schemas.microsoft.com/office/drawing/2014/main" id="{67A32EBC-4214-2B06-3C32-1669C4E38E74}"/>
-              </a:ext>
-            </a:extLst>
-          </p:cNvPr>
-          <p:cNvSpPr txBox="1"/>
-          <p:nvPr/>
-        </p:nvSpPr>
-        <p:spPr>
-          <a:xfrm>
-            <a:off x="263324" y="3178621"/>
-            <a:ext cx="4662804" cy="923330"/>
-          </a:xfrm>
-          <a:prstGeom prst="rect">
-            <a:avLst/>
-          </a:prstGeom>
-          <a:noFill/>
-          <a:ln>
-            <a:solidFill>
-              <a:schemeClr val="tx1"/>
-            </a:solidFill>
-          </a:ln>
-        </p:spPr>
-        <p:txBody>
-          <a:bodyPr wrap="square" rtlCol="0">
-            <a:spAutoFit/>
-          </a:bodyPr>
-          <a:lstStyle/>
-          <a:p>
-            <a:r>
-              <a:rPr lang="nl-NL" i="1" dirty="0">
-                <a:latin typeface="Times New Roman" panose="02020603050405020304" pitchFamily="18" charset="0"/>
-                <a:cs typeface="Times New Roman" panose="02020603050405020304" pitchFamily="18" charset="0"/>
-              </a:rPr>
-              <a:t>Wat zullen we eens eten vanavond? &lt;MASK_1&gt; de Volkskrant een verrassend en smakelijk recept. Vandaag:</a:t>
-            </a:r>
-          </a:p>
-        </p:txBody>
-      </p:sp>
-      <p:cxnSp>
-        <p:nvCxnSpPr>
-          <p:cNvPr id="24" name="Straight Arrow Connector 23">
-            <a:extLst>
-              <a:ext uri="{FF2B5EF4-FFF2-40B4-BE49-F238E27FC236}">
-                <a16:creationId xmlns:a16="http://schemas.microsoft.com/office/drawing/2014/main" id="{899DE630-1CA4-0F75-6B78-88F277825719}"/>
-              </a:ext>
-            </a:extLst>
-          </p:cNvPr>
-          <p:cNvCxnSpPr>
-            <a:cxnSpLocks/>
-          </p:cNvCxnSpPr>
-          <p:nvPr/>
-        </p:nvCxnSpPr>
-        <p:spPr>
-          <a:xfrm>
-            <a:off x="2605276" y="1775487"/>
-            <a:ext cx="0" cy="996292"/>
-          </a:xfrm>
-          <a:prstGeom prst="straightConnector1">
-            <a:avLst/>
-          </a:prstGeom>
-          <a:ln>
-            <a:tailEnd type="triangle"/>
-          </a:ln>
-        </p:spPr>
-        <p:style>
-          <a:lnRef idx="2">
-            <a:schemeClr val="dk1"/>
-          </a:lnRef>
-          <a:fillRef idx="0">
-            <a:schemeClr val="dk1"/>
-          </a:fillRef>
-          <a:effectRef idx="1">
-            <a:schemeClr val="dk1"/>
-          </a:effectRef>
-          <a:fontRef idx="minor">
-            <a:schemeClr val="tx1"/>
-          </a:fontRef>
-        </p:style>
-      </p:cxnSp>
-      <p:sp>
-        <p:nvSpPr>
-          <p:cNvPr id="26" name="TextBox 25">
-            <a:extLst>
-              <a:ext uri="{FF2B5EF4-FFF2-40B4-BE49-F238E27FC236}">
-                <a16:creationId xmlns:a16="http://schemas.microsoft.com/office/drawing/2014/main" id="{06EAAABE-2D20-AF6D-6D9D-B30EE7500364}"/>
-              </a:ext>
-            </a:extLst>
-          </p:cNvPr>
-          <p:cNvSpPr txBox="1"/>
-          <p:nvPr/>
-        </p:nvSpPr>
-        <p:spPr>
-          <a:xfrm>
-            <a:off x="6530626" y="360399"/>
-            <a:ext cx="2129673" cy="646331"/>
-          </a:xfrm>
-          <a:prstGeom prst="rect">
-            <a:avLst/>
-          </a:prstGeom>
-          <a:noFill/>
-        </p:spPr>
-        <p:txBody>
-          <a:bodyPr wrap="square" rtlCol="0">
-            <a:spAutoFit/>
-          </a:bodyPr>
-          <a:lstStyle/>
-          <a:p>
-            <a:pPr algn="ctr"/>
-            <a:r>
-              <a:rPr lang="nl-NL" b="1" noProof="1">
-                <a:latin typeface="Times New Roman" panose="02020603050405020304" pitchFamily="18" charset="0"/>
-                <a:cs typeface="Times New Roman" panose="02020603050405020304" pitchFamily="18" charset="0"/>
-              </a:rPr>
-              <a:t>Masked input tokens</a:t>
-            </a:r>
-          </a:p>
-        </p:txBody>
-      </p:sp>
-      <p:sp>
-        <p:nvSpPr>
-          <p:cNvPr id="27" name="TextBox 26">
-            <a:extLst>
-              <a:ext uri="{FF2B5EF4-FFF2-40B4-BE49-F238E27FC236}">
-                <a16:creationId xmlns:a16="http://schemas.microsoft.com/office/drawing/2014/main" id="{34B6ABE2-5B2C-5655-2CF8-E57F52E9EA23}"/>
-              </a:ext>
-            </a:extLst>
-          </p:cNvPr>
-          <p:cNvSpPr txBox="1"/>
-          <p:nvPr/>
-        </p:nvSpPr>
-        <p:spPr>
-          <a:xfrm>
-            <a:off x="6530626" y="951092"/>
-            <a:ext cx="2129673" cy="369332"/>
-          </a:xfrm>
-          <a:prstGeom prst="rect">
-            <a:avLst/>
-          </a:prstGeom>
-          <a:noFill/>
-          <a:ln>
-            <a:solidFill>
-              <a:schemeClr val="tx1"/>
-            </a:solidFill>
-          </a:ln>
-        </p:spPr>
-        <p:txBody>
-          <a:bodyPr wrap="square" rtlCol="0">
-            <a:spAutoFit/>
-          </a:bodyPr>
-          <a:lstStyle/>
-          <a:p>
-            <a:r>
-              <a:rPr lang="nl-NL" dirty="0">
-                <a:latin typeface="Times New Roman" panose="02020603050405020304" pitchFamily="18" charset="0"/>
-                <a:cs typeface="Times New Roman" panose="02020603050405020304" pitchFamily="18" charset="0"/>
-              </a:rPr>
-              <a:t>[</a:t>
-            </a:r>
-            <a:r>
-              <a:rPr lang="nl-NL" i="1" dirty="0">
-                <a:latin typeface="Times New Roman" panose="02020603050405020304" pitchFamily="18" charset="0"/>
-                <a:cs typeface="Times New Roman" panose="02020603050405020304" pitchFamily="18" charset="0"/>
-              </a:rPr>
-              <a:t>Elke dag in</a:t>
-            </a:r>
-            <a:r>
-              <a:rPr lang="nl-NL" dirty="0">
-                <a:latin typeface="Times New Roman" panose="02020603050405020304" pitchFamily="18" charset="0"/>
-                <a:cs typeface="Times New Roman" panose="02020603050405020304" pitchFamily="18" charset="0"/>
-              </a:rPr>
-              <a:t>]</a:t>
-            </a:r>
-          </a:p>
-        </p:txBody>
-      </p:sp>
-      <p:sp>
-        <p:nvSpPr>
-          <p:cNvPr id="28" name="TextBox 27">
-            <a:extLst>
-              <a:ext uri="{FF2B5EF4-FFF2-40B4-BE49-F238E27FC236}">
-                <a16:creationId xmlns:a16="http://schemas.microsoft.com/office/drawing/2014/main" id="{91FE7876-A842-A7F2-F8B5-DF58F160B258}"/>
-              </a:ext>
-            </a:extLst>
-          </p:cNvPr>
-          <p:cNvSpPr txBox="1"/>
-          <p:nvPr/>
-        </p:nvSpPr>
-        <p:spPr>
-          <a:xfrm>
-            <a:off x="6530627" y="3382867"/>
-            <a:ext cx="2129672" cy="369332"/>
-          </a:xfrm>
-          <a:prstGeom prst="rect">
-            <a:avLst/>
-          </a:prstGeom>
-          <a:noFill/>
-          <a:ln>
-            <a:solidFill>
-              <a:schemeClr val="tx1"/>
-            </a:solidFill>
-          </a:ln>
-        </p:spPr>
-        <p:txBody>
-          <a:bodyPr wrap="square" rtlCol="0">
-            <a:spAutoFit/>
-          </a:bodyPr>
-          <a:lstStyle/>
-          <a:p>
-            <a:r>
-              <a:rPr lang="nl-NL" dirty="0">
-                <a:latin typeface="Times New Roman" panose="02020603050405020304" pitchFamily="18" charset="0"/>
-                <a:cs typeface="Times New Roman" panose="02020603050405020304" pitchFamily="18" charset="0"/>
-              </a:rPr>
-              <a:t>[</a:t>
-            </a:r>
-            <a:r>
-              <a:rPr lang="nl-NL" i="1" dirty="0">
-                <a:latin typeface="Times New Roman" panose="02020603050405020304" pitchFamily="18" charset="0"/>
-                <a:cs typeface="Times New Roman" panose="02020603050405020304" pitchFamily="18" charset="0"/>
-              </a:rPr>
-              <a:t>Elke dag publiceert</a:t>
-            </a:r>
-            <a:r>
-              <a:rPr lang="nl-NL" dirty="0">
-                <a:latin typeface="Times New Roman" panose="02020603050405020304" pitchFamily="18" charset="0"/>
-                <a:cs typeface="Times New Roman" panose="02020603050405020304" pitchFamily="18" charset="0"/>
-              </a:rPr>
-              <a:t>]</a:t>
-            </a:r>
-          </a:p>
-        </p:txBody>
-      </p:sp>
-      <p:sp>
-        <p:nvSpPr>
-          <p:cNvPr id="29" name="TextBox 28">
-            <a:extLst>
-              <a:ext uri="{FF2B5EF4-FFF2-40B4-BE49-F238E27FC236}">
-                <a16:creationId xmlns:a16="http://schemas.microsoft.com/office/drawing/2014/main" id="{CCD6794F-E6F9-7888-C44B-A07797FC23B8}"/>
-              </a:ext>
-            </a:extLst>
-          </p:cNvPr>
-          <p:cNvSpPr txBox="1"/>
-          <p:nvPr/>
-        </p:nvSpPr>
-        <p:spPr>
-          <a:xfrm>
-            <a:off x="6530626" y="2792174"/>
-            <a:ext cx="2384977" cy="646331"/>
-          </a:xfrm>
-          <a:prstGeom prst="rect">
-            <a:avLst/>
-          </a:prstGeom>
-          <a:noFill/>
-        </p:spPr>
-        <p:txBody>
-          <a:bodyPr wrap="square" rtlCol="0">
-            <a:spAutoFit/>
-          </a:bodyPr>
-          <a:lstStyle/>
-          <a:p>
-            <a:pPr algn="ctr"/>
-            <a:r>
-              <a:rPr lang="nl-NL" b="1" noProof="1">
-                <a:latin typeface="Times New Roman" panose="02020603050405020304" pitchFamily="18" charset="0"/>
-                <a:cs typeface="Times New Roman" panose="02020603050405020304" pitchFamily="18" charset="0"/>
-              </a:rPr>
-              <a:t>Model generated tokens</a:t>
-            </a:r>
-          </a:p>
-        </p:txBody>
-      </p:sp>
-      <p:sp>
-        <p:nvSpPr>
-          <p:cNvPr id="30" name="TextBox 29">
-            <a:extLst>
-              <a:ext uri="{FF2B5EF4-FFF2-40B4-BE49-F238E27FC236}">
-                <a16:creationId xmlns:a16="http://schemas.microsoft.com/office/drawing/2014/main" id="{70ADC0D6-FEE6-E1B9-62E5-87B9B552F38F}"/>
-              </a:ext>
-            </a:extLst>
-          </p:cNvPr>
-          <p:cNvSpPr txBox="1"/>
-          <p:nvPr/>
-        </p:nvSpPr>
-        <p:spPr>
-          <a:xfrm>
-            <a:off x="9065649" y="2487887"/>
-            <a:ext cx="2291463" cy="369332"/>
-          </a:xfrm>
-          <a:prstGeom prst="rect">
-            <a:avLst/>
-          </a:prstGeom>
-          <a:noFill/>
-          <a:ln>
-            <a:solidFill>
-              <a:schemeClr val="tx1"/>
-            </a:solidFill>
-          </a:ln>
-        </p:spPr>
-        <p:txBody>
-          <a:bodyPr wrap="square" rtlCol="0">
-            <a:spAutoFit/>
-          </a:bodyPr>
-          <a:lstStyle/>
-          <a:p>
-            <a:r>
-              <a:rPr lang="nl-NL" dirty="0">
-                <a:latin typeface="Times New Roman" panose="02020603050405020304" pitchFamily="18" charset="0"/>
-                <a:cs typeface="Times New Roman" panose="02020603050405020304" pitchFamily="18" charset="0"/>
-              </a:rPr>
-              <a:t>0.47</a:t>
-            </a:r>
-          </a:p>
-        </p:txBody>
-      </p:sp>
-      <p:sp>
-        <p:nvSpPr>
-          <p:cNvPr id="31" name="TextBox 30">
-            <a:extLst>
-              <a:ext uri="{FF2B5EF4-FFF2-40B4-BE49-F238E27FC236}">
-                <a16:creationId xmlns:a16="http://schemas.microsoft.com/office/drawing/2014/main" id="{14BEDDD3-C124-B870-F3D7-AD28544731F8}"/>
-              </a:ext>
-            </a:extLst>
-          </p:cNvPr>
-          <p:cNvSpPr txBox="1"/>
-          <p:nvPr/>
-        </p:nvSpPr>
-        <p:spPr>
-          <a:xfrm>
-            <a:off x="9065656" y="1808725"/>
-            <a:ext cx="2291464" cy="646331"/>
-          </a:xfrm>
-          <a:prstGeom prst="rect">
-            <a:avLst/>
-          </a:prstGeom>
-          <a:noFill/>
-        </p:spPr>
-        <p:txBody>
-          <a:bodyPr wrap="square" rtlCol="0">
-            <a:spAutoFit/>
-          </a:bodyPr>
-          <a:lstStyle/>
-          <a:p>
-            <a:pPr algn="ctr"/>
-            <a:r>
-              <a:rPr lang="nl-NL" b="1" noProof="1">
-                <a:latin typeface="Times New Roman" panose="02020603050405020304" pitchFamily="18" charset="0"/>
-                <a:cs typeface="Times New Roman" panose="02020603050405020304" pitchFamily="18" charset="0"/>
-              </a:rPr>
-              <a:t>Levenshtein distance (normalized)</a:t>
-            </a:r>
-          </a:p>
-        </p:txBody>
-      </p:sp>
-      <p:cxnSp>
-        <p:nvCxnSpPr>
-          <p:cNvPr id="32" name="Straight Arrow Connector 31">
-            <a:extLst>
-              <a:ext uri="{FF2B5EF4-FFF2-40B4-BE49-F238E27FC236}">
-                <a16:creationId xmlns:a16="http://schemas.microsoft.com/office/drawing/2014/main" id="{77C8BB9E-5BCC-C951-5203-FB91D4C68AFB}"/>
-              </a:ext>
-            </a:extLst>
-          </p:cNvPr>
-          <p:cNvCxnSpPr>
-            <a:cxnSpLocks/>
-          </p:cNvCxnSpPr>
-          <p:nvPr/>
-        </p:nvCxnSpPr>
-        <p:spPr>
-          <a:xfrm>
-            <a:off x="5192154" y="1162260"/>
-            <a:ext cx="1056249" cy="0"/>
-          </a:xfrm>
-          <a:prstGeom prst="straightConnector1">
-            <a:avLst/>
-          </a:prstGeom>
-          <a:ln>
-            <a:tailEnd type="triangle"/>
-          </a:ln>
-        </p:spPr>
-        <p:style>
-          <a:lnRef idx="2">
-            <a:schemeClr val="dk1"/>
-          </a:lnRef>
-          <a:fillRef idx="0">
-            <a:schemeClr val="dk1"/>
-          </a:fillRef>
-          <a:effectRef idx="1">
-            <a:schemeClr val="dk1"/>
-          </a:effectRef>
-          <a:fontRef idx="minor">
-            <a:schemeClr val="tx1"/>
-          </a:fontRef>
-        </p:style>
-      </p:cxnSp>
-      <p:cxnSp>
-        <p:nvCxnSpPr>
-          <p:cNvPr id="33" name="Straight Arrow Connector 32">
-            <a:extLst>
-              <a:ext uri="{FF2B5EF4-FFF2-40B4-BE49-F238E27FC236}">
-                <a16:creationId xmlns:a16="http://schemas.microsoft.com/office/drawing/2014/main" id="{A285B488-A958-C128-7D02-54DA31B3E29C}"/>
-              </a:ext>
-            </a:extLst>
-          </p:cNvPr>
-          <p:cNvCxnSpPr>
-            <a:cxnSpLocks/>
-          </p:cNvCxnSpPr>
-          <p:nvPr/>
-        </p:nvCxnSpPr>
-        <p:spPr>
-          <a:xfrm>
-            <a:off x="8756994" y="1170538"/>
-            <a:ext cx="309600" cy="320400"/>
-          </a:xfrm>
-          <a:prstGeom prst="straightConnector1">
-            <a:avLst/>
-          </a:prstGeom>
-          <a:ln>
-            <a:tailEnd type="triangle"/>
-          </a:ln>
-        </p:spPr>
-        <p:style>
-          <a:lnRef idx="2">
-            <a:schemeClr val="dk1"/>
-          </a:lnRef>
-          <a:fillRef idx="0">
-            <a:schemeClr val="dk1"/>
-          </a:fillRef>
-          <a:effectRef idx="1">
-            <a:schemeClr val="dk1"/>
-          </a:effectRef>
-          <a:fontRef idx="minor">
-            <a:schemeClr val="tx1"/>
-          </a:fontRef>
-        </p:style>
-      </p:cxnSp>
-      <p:cxnSp>
-        <p:nvCxnSpPr>
-          <p:cNvPr id="35" name="Straight Arrow Connector 34">
-            <a:extLst>
-              <a:ext uri="{FF2B5EF4-FFF2-40B4-BE49-F238E27FC236}">
-                <a16:creationId xmlns:a16="http://schemas.microsoft.com/office/drawing/2014/main" id="{27722FB4-9689-0075-34A2-2529A2BAD347}"/>
-              </a:ext>
-            </a:extLst>
-          </p:cNvPr>
-          <p:cNvCxnSpPr>
-            <a:cxnSpLocks/>
-          </p:cNvCxnSpPr>
-          <p:nvPr/>
-        </p:nvCxnSpPr>
-        <p:spPr>
-          <a:xfrm flipV="1">
-            <a:off x="8756995" y="3243690"/>
-            <a:ext cx="308661" cy="320336"/>
-          </a:xfrm>
-          <a:prstGeom prst="straightConnector1">
-            <a:avLst/>
-          </a:prstGeom>
-          <a:ln>
-            <a:tailEnd type="triangle"/>
-          </a:ln>
-        </p:spPr>
-        <p:style>
-          <a:lnRef idx="2">
-            <a:schemeClr val="dk1"/>
-          </a:lnRef>
-          <a:fillRef idx="0">
-            <a:schemeClr val="dk1"/>
-          </a:fillRef>
-          <a:effectRef idx="1">
-            <a:schemeClr val="dk1"/>
-          </a:effectRef>
-          <a:fontRef idx="minor">
-            <a:schemeClr val="tx1"/>
-          </a:fontRef>
-        </p:style>
-      </p:cxnSp>
+            </a:fontRef>
+          </p:style>
+        </p:cxnSp>
+        <p:sp>
+          <p:nvSpPr>
+            <p:cNvPr id="6" name="TextBox 5">
+              <a:extLst>
+                <a:ext uri="{FF2B5EF4-FFF2-40B4-BE49-F238E27FC236}">
+                  <a16:creationId xmlns:a16="http://schemas.microsoft.com/office/drawing/2014/main" id="{F2726C09-1310-0F93-509F-6B9A2994F9AA}"/>
+                </a:ext>
+              </a:extLst>
+            </p:cNvPr>
+            <p:cNvSpPr txBox="1"/>
+            <p:nvPr/>
+          </p:nvSpPr>
+          <p:spPr>
+            <a:xfrm>
+              <a:off x="5176644" y="5487987"/>
+              <a:ext cx="1845728" cy="338554"/>
+            </a:xfrm>
+            <a:prstGeom prst="rect">
+              <a:avLst/>
+            </a:prstGeom>
+            <a:noFill/>
+          </p:spPr>
+          <p:txBody>
+            <a:bodyPr wrap="square" rtlCol="0">
+              <a:spAutoFit/>
+            </a:bodyPr>
+            <a:lstStyle/>
+            <a:p>
+              <a:r>
+                <a:rPr lang="nl-NL" sz="1600" dirty="0">
+                  <a:latin typeface="Times New Roman" panose="02020603050405020304" pitchFamily="18" charset="0"/>
+                  <a:cs typeface="Times New Roman" panose="02020603050405020304" pitchFamily="18" charset="0"/>
+                </a:rPr>
+                <a:t>Sequence masking</a:t>
+              </a:r>
+            </a:p>
+          </p:txBody>
+        </p:sp>
+      </p:grpSp>
     </p:spTree>
     <p:extLst>
       <p:ext uri="{BB962C8B-B14F-4D97-AF65-F5344CB8AC3E}">

</xml_diff>